<commit_message>
update deck to address latest comments
</commit_message>
<xml_diff>
--- a/presentation/Helm.pptx
+++ b/presentation/Helm.pptx
@@ -258,7 +258,7 @@
           <a:p>
             <a:fld id="{1896C5F1-DFC7-F145-B4AD-03FC2D991F8F}" type="datetimeFigureOut">
               <a:rPr lang="en-US" smtClean="0"/>
-              <a:t>9/4/18</a:t>
+              <a:t>9/14/18</a:t>
             </a:fld>
             <a:endParaRPr lang="en-US"/>
           </a:p>
@@ -435,7 +435,7 @@
           <a:p>
             <a:fld id="{464BA5E9-42AC-FB44-A01A-932FDCCD8508}" type="datetimeFigureOut">
               <a:rPr lang="en-US" smtClean="0"/>
-              <a:t>9/4/18</a:t>
+              <a:t>9/14/18</a:t>
             </a:fld>
             <a:endParaRPr lang="en-US"/>
           </a:p>
@@ -974,8 +974,37 @@
             </a:r>
             <a:r>
               <a:rPr lang="en-US" dirty="0"/>
-              <a:t> i.e. the github repository is also used as a chart repository. </a:t>
-            </a:r>
+              <a:t> i.e. the github repository is also used as a chart repository. WE SHOULD emphasize on how template works in Helm – i.e. cover the template directory and all the files underneath - mention that templates directory files are used to create Kubernetes manifest files and they are typically YAML file with two exceptions, </a:t>
+            </a:r>
+            <a:r>
+              <a:rPr lang="en-US" dirty="0" err="1"/>
+              <a:t>NOTES.txt</a:t>
+            </a:r>
+            <a:r>
+              <a:rPr lang="en-US" dirty="0"/>
+              <a:t> and _</a:t>
+            </a:r>
+            <a:r>
+              <a:rPr lang="en-US" dirty="0" err="1"/>
+              <a:t>helpers.tpl</a:t>
+            </a:r>
+            <a:r>
+              <a:rPr lang="en-US" dirty="0"/>
+              <a:t>. The </a:t>
+            </a:r>
+            <a:r>
+              <a:rPr lang="en-US" dirty="0" err="1"/>
+              <a:t>NOTES.txt</a:t>
+            </a:r>
+            <a:r>
+              <a:rPr lang="en-US" dirty="0"/>
+              <a:t> is a special file used to display desired output to the users. All the files with underscore are to create global variables and these files will not be processed towards </a:t>
+            </a:r>
+            <a:r>
+              <a:rPr lang="en-US"/>
+              <a:t>creating manifests files. </a:t>
+            </a:r>
+            <a:endParaRPr lang="en-US" dirty="0"/>
           </a:p>
         </p:txBody>
       </p:sp>
@@ -5030,7 +5059,7 @@
           <a:p>
             <a:fld id="{9564BD44-9ED7-6744-A12F-3CD373F188E6}" type="datetime1">
               <a:rPr lang="en-US" smtClean="0"/>
-              <a:t>9/4/18</a:t>
+              <a:t>9/14/18</a:t>
             </a:fld>
             <a:endParaRPr lang="en-US"/>
           </a:p>
@@ -5286,7 +5315,7 @@
           <a:p>
             <a:fld id="{43B2E437-D25F-904D-B749-4AC8A14AAE67}" type="datetime1">
               <a:rPr lang="en-US" smtClean="0"/>
-              <a:t>9/4/18</a:t>
+              <a:t>9/14/18</a:t>
             </a:fld>
             <a:endParaRPr lang="en-US"/>
           </a:p>
@@ -5454,7 +5483,7 @@
           <a:p>
             <a:fld id="{846D04EA-8894-0C4E-A96C-33E58E1FD5B9}" type="datetime1">
               <a:rPr lang="en-US" smtClean="0"/>
-              <a:t>9/4/18</a:t>
+              <a:t>9/14/18</a:t>
             </a:fld>
             <a:endParaRPr lang="en-US"/>
           </a:p>
@@ -5632,7 +5661,7 @@
           <a:p>
             <a:fld id="{E1560804-0135-6347-9F37-DD0AC3C4B575}" type="datetime1">
               <a:rPr lang="en-US" smtClean="0"/>
-              <a:t>9/4/18</a:t>
+              <a:t>9/14/18</a:t>
             </a:fld>
             <a:endParaRPr lang="en-US"/>
           </a:p>
@@ -6099,7 +6128,7 @@
           <a:p>
             <a:fld id="{F96B7D31-5740-2540-960E-830772103504}" type="datetime1">
               <a:rPr lang="en-US" smtClean="0"/>
-              <a:t>9/4/18</a:t>
+              <a:t>9/14/18</a:t>
             </a:fld>
             <a:endParaRPr lang="en-US"/>
           </a:p>
@@ -6291,7 +6320,7 @@
           <a:p>
             <a:fld id="{F96B7D31-5740-2540-960E-830772103504}" type="datetime1">
               <a:rPr lang="en-US" smtClean="0"/>
-              <a:t>9/4/18</a:t>
+              <a:t>9/14/18</a:t>
             </a:fld>
             <a:endParaRPr lang="en-US"/>
           </a:p>
@@ -6536,7 +6565,7 @@
           <a:p>
             <a:fld id="{77EC05AD-9AC1-8446-A891-E4BC6F95154C}" type="datetime1">
               <a:rPr lang="en-US" smtClean="0"/>
-              <a:t>9/4/18</a:t>
+              <a:t>9/14/18</a:t>
             </a:fld>
             <a:endParaRPr lang="en-US"/>
           </a:p>
@@ -6765,7 +6794,7 @@
           <a:p>
             <a:fld id="{DE4D9D6A-AB2F-ED4A-9D2B-3CFA16DBB150}" type="datetime1">
               <a:rPr lang="en-US" smtClean="0"/>
-              <a:t>9/4/18</a:t>
+              <a:t>9/14/18</a:t>
             </a:fld>
             <a:endParaRPr lang="en-US"/>
           </a:p>
@@ -7102,7 +7131,7 @@
           <a:p>
             <a:fld id="{0ACF4E32-9DFF-F54A-A4F0-10CAAEC3737C}" type="datetime1">
               <a:rPr lang="en-US" smtClean="0"/>
-              <a:t>9/4/18</a:t>
+              <a:t>9/14/18</a:t>
             </a:fld>
             <a:endParaRPr lang="en-US"/>
           </a:p>
@@ -7257,7 +7286,7 @@
           <a:p>
             <a:fld id="{6FD436D8-76DC-4C48-B223-3722A1528131}" type="datetime1">
               <a:rPr lang="en-US" smtClean="0"/>
-              <a:t>9/4/18</a:t>
+              <a:t>9/14/18</a:t>
             </a:fld>
             <a:endParaRPr lang="en-US"/>
           </a:p>
@@ -7352,7 +7381,7 @@
           <a:p>
             <a:fld id="{9183B1C4-DA41-6E4A-A890-D17D6ADE85A2}" type="datetime1">
               <a:rPr lang="en-US" smtClean="0"/>
-              <a:t>9/4/18</a:t>
+              <a:t>9/14/18</a:t>
             </a:fld>
             <a:endParaRPr lang="en-US"/>
           </a:p>
@@ -7627,7 +7656,7 @@
           <a:p>
             <a:fld id="{9839626B-35B3-0843-BA5F-60AC1169B3F2}" type="datetime1">
               <a:rPr lang="en-US" smtClean="0"/>
-              <a:t>9/4/18</a:t>
+              <a:t>9/14/18</a:t>
             </a:fld>
             <a:endParaRPr lang="en-US"/>
           </a:p>
@@ -7895,7 +7924,7 @@
           <a:p>
             <a:fld id="{CA6D735F-2293-754C-9C95-4FF5C0C5987C}" type="datetime1">
               <a:rPr lang="en-US" smtClean="0"/>
-              <a:t>9/4/18</a:t>
+              <a:t>9/14/18</a:t>
             </a:fld>
             <a:endParaRPr lang="en-US"/>
           </a:p>
@@ -8434,6 +8463,16 @@
           <a:bodyPr/>
           <a:lstStyle/>
           <a:p>
+            <a:r>
+              <a:rPr lang="en-US" dirty="0"/>
+              <a:t>Sahdev Zala</a:t>
+            </a:r>
+          </a:p>
+          <a:p>
+            <a:r>
+              <a:rPr lang="en-US" dirty="0" err="1"/>
+              <a:t>spzala@us.ibm.com</a:t>
+            </a:r>
             <a:endParaRPr lang="en-US" dirty="0"/>
           </a:p>
         </p:txBody>
@@ -11282,8 +11321,8 @@
           <a:p>
             <a:pPr lvl="1"/>
             <a:r>
-              <a:rPr lang="en-US" dirty="0" err="1"/>
-              <a:t>Kubectl</a:t>
+              <a:rPr lang="en-US" i="1" dirty="0" err="1"/>
+              <a:t>kubectl</a:t>
             </a:r>
             <a:r>
               <a:rPr lang="en-US" dirty="0"/>
@@ -12034,16 +12073,16 @@
           <a:p>
             <a:r>
               <a:rPr lang="en-US" b="0" dirty="0"/>
-              <a:t>Refer to the, </a:t>
-            </a:r>
-            <a:r>
-              <a:rPr lang="en-US" dirty="0">
+              <a:t>Find out more, </a:t>
+            </a:r>
+            <a:r>
+              <a:rPr lang="en-US" b="0" dirty="0">
                 <a:hlinkClick r:id="rId3"/>
               </a:rPr>
               <a:t>https://github.com/kubernetes/helm#install</a:t>
             </a:r>
             <a:r>
-              <a:rPr lang="en-US" dirty="0"/>
+              <a:rPr lang="en-US" b="0" dirty="0"/>
               <a:t> </a:t>
             </a:r>
           </a:p>
@@ -12263,7 +12302,7 @@
           <a:p>
             <a:r>
               <a:rPr lang="en-US" b="0" dirty="0"/>
-              <a:t>Securing Helm server requires additional installation steps. Refer to the, </a:t>
+              <a:t>Securing Helm server requires additional installation steps. Find out more, </a:t>
             </a:r>
             <a:r>
               <a:rPr lang="en-US" sz="2400" b="0" dirty="0">
@@ -13673,7 +13712,7 @@
         <p:spPr/>
         <p:txBody>
           <a:bodyPr>
-            <a:normAutofit fontScale="92500" lnSpcReduction="10000"/>
+            <a:normAutofit/>
           </a:bodyPr>
           <a:lstStyle/>
           <a:p>
@@ -13682,36 +13721,30 @@
               <a:t>GitHub repository - </a:t>
             </a:r>
             <a:r>
-              <a:rPr lang="en-US" sz="1800" b="0" dirty="0">
+              <a:rPr lang="en-US" sz="1900" b="0" dirty="0">
                 <a:hlinkClick r:id="rId3"/>
               </a:rPr>
-              <a:t>https://github.com/kubernetes/helm</a:t>
-            </a:r>
-            <a:endParaRPr lang="en-US" sz="1800" b="0" dirty="0"/>
+              <a:t>https://github.com/helm/helm</a:t>
+            </a:r>
+            <a:r>
+              <a:rPr lang="en-US" sz="1900" b="0" dirty="0"/>
+              <a:t> </a:t>
+            </a:r>
           </a:p>
           <a:p>
             <a:r>
               <a:rPr lang="en-US" b="0" dirty="0"/>
-              <a:t>Special Interest Group (SIG) - </a:t>
+              <a:t>Slack channels on the Kubernetes Slack - </a:t>
             </a:r>
             <a:r>
               <a:rPr lang="en-US" sz="1800" b="0" dirty="0">
                 <a:hlinkClick r:id="rId4"/>
               </a:rPr>
-              <a:t>https://github.com/kubernetes/community/tree/master/sig-apps</a:t>
-            </a:r>
-            <a:endParaRPr lang="en-US" sz="1800" b="0" dirty="0"/>
-          </a:p>
-          <a:p>
-            <a:r>
-              <a:rPr lang="en-US" b="0" dirty="0"/>
-              <a:t>HELM is  a separate project under CNCF now. </a:t>
-            </a:r>
-          </a:p>
-          <a:p>
-            <a:r>
-              <a:rPr lang="en-US" b="0" dirty="0"/>
-              <a:t>Slack channels on Kubernetes slack </a:t>
+              <a:t>http://slack.k8s.io/</a:t>
+            </a:r>
+            <a:r>
+              <a:rPr lang="en-US" sz="1800" b="0" dirty="0"/>
+              <a:t> </a:t>
             </a:r>
           </a:p>
           <a:p>
@@ -13740,80 +13773,84 @@
               <a:rPr lang="en-US" b="0" dirty="0"/>
               <a:t>Mailing list</a:t>
             </a:r>
-          </a:p>
-          <a:p>
-            <a:pPr lvl="1"/>
-            <a:r>
-              <a:rPr lang="en-US" dirty="0"/>
-              <a:t>Helm mailing list - </a:t>
-            </a:r>
-            <a:r>
-              <a:rPr lang="en-US" sz="1800" dirty="0">
+            <a:r>
+              <a:rPr lang="en-US" dirty="0"/>
+              <a:t> </a:t>
+            </a:r>
+            <a:r>
+              <a:rPr lang="en-US" b="0" dirty="0"/>
+              <a:t>- </a:t>
+            </a:r>
+            <a:r>
+              <a:rPr lang="en-US" sz="1800" b="0" dirty="0">
                 <a:hlinkClick r:id="rId5"/>
               </a:rPr>
               <a:t>https://lists.cncf.io/g/cncf-kubernetes-helm</a:t>
             </a:r>
             <a:r>
-              <a:rPr lang="en-US" sz="1800" dirty="0"/>
+              <a:rPr lang="en-US" sz="1800" b="0" dirty="0"/>
               <a:t> </a:t>
             </a:r>
           </a:p>
           <a:p>
-            <a:pPr lvl="1"/>
-            <a:r>
-              <a:rPr lang="en-US" dirty="0"/>
-              <a:t>Kubernetes SIG Apps Mailing List - </a:t>
-            </a:r>
-            <a:r>
-              <a:rPr lang="en-US" sz="1800" dirty="0">
+            <a:r>
+              <a:rPr lang="en-US" b="0" dirty="0"/>
+              <a:t>Developer call </a:t>
+            </a:r>
+            <a:r>
+              <a:rPr lang="en-US" sz="2400" b="0" dirty="0"/>
+              <a:t>Every Thursdays at 9:30-10:00 Pacific - </a:t>
+            </a:r>
+            <a:r>
+              <a:rPr lang="en-US" sz="1800" b="0" dirty="0">
                 <a:hlinkClick r:id="rId6"/>
               </a:rPr>
-              <a:t>https://groups.google.com/forum/#!forum/kubernetes-sig-apps</a:t>
-            </a:r>
-            <a:r>
-              <a:rPr lang="en-US" sz="1800" dirty="0"/>
-              <a:t> </a:t>
-            </a:r>
+              <a:t>https://zoom.us/j/696660622</a:t>
+            </a:r>
+            <a:endParaRPr lang="en-US" sz="1800" b="0" dirty="0"/>
           </a:p>
           <a:p>
             <a:r>
               <a:rPr lang="en-US" b="0" dirty="0"/>
-              <a:t>Developer call </a:t>
-            </a:r>
-            <a:r>
-              <a:rPr lang="mr-IN" b="0" dirty="0"/>
-              <a:t>–</a:t>
-            </a:r>
-            <a:r>
-              <a:rPr lang="en-US" b="0" dirty="0"/>
-              <a:t> </a:t>
-            </a:r>
-            <a:r>
-              <a:rPr lang="en-US" sz="2400" b="0" dirty="0"/>
-              <a:t>Every Thursdays at 9:30-10:00 Pacific.</a:t>
-            </a:r>
-            <a:r>
-              <a:rPr lang="en-US" sz="2000" b="0" dirty="0"/>
-              <a:t> </a:t>
+              <a:t>Helm Documentation - </a:t>
             </a:r>
             <a:r>
               <a:rPr lang="en-US" sz="1800" b="0" dirty="0">
                 <a:hlinkClick r:id="rId7"/>
               </a:rPr>
-              <a:t>https://zoom.us/j/4526666954</a:t>
-            </a:r>
-            <a:endParaRPr lang="en-US" sz="1800" b="0" dirty="0"/>
+              <a:t>https://docs.helm.sh</a:t>
+            </a:r>
+            <a:r>
+              <a:rPr lang="en-US" sz="1800" b="0" dirty="0"/>
+              <a:t> </a:t>
+            </a:r>
           </a:p>
           <a:p>
             <a:r>
               <a:rPr lang="en-US" b="0" dirty="0"/>
-              <a:t>Helm Documentation: https://</a:t>
-            </a:r>
-            <a:r>
-              <a:rPr lang="en-US" b="0" dirty="0" err="1"/>
-              <a:t>docs.helm.sh</a:t>
-            </a:r>
-            <a:endParaRPr lang="en-US" b="0" dirty="0"/>
+              <a:t>Interested in contributing to the Helm? </a:t>
+            </a:r>
+          </a:p>
+          <a:p>
+            <a:pPr lvl="1"/>
+            <a:r>
+              <a:rPr lang="en-US" b="0" dirty="0"/>
+              <a:t>Refer to the Helm Community </a:t>
+            </a:r>
+            <a:r>
+              <a:rPr lang="en-US" sz="1400" b="0" dirty="0"/>
+              <a:t>- </a:t>
+            </a:r>
+            <a:r>
+              <a:rPr lang="en-US" sz="1800" b="0" dirty="0">
+                <a:hlinkClick r:id="rId8"/>
+              </a:rPr>
+              <a:t>https://github.com/helm/community</a:t>
+            </a:r>
+            <a:r>
+              <a:rPr lang="en-US" sz="1800" b="0" dirty="0"/>
+              <a:t> </a:t>
+            </a:r>
           </a:p>
         </p:txBody>
       </p:sp>
@@ -14016,7 +14053,7 @@
         </p:nvSpPr>
         <p:spPr>
           <a:xfrm>
-            <a:off x="3638840" y="4309686"/>
+            <a:off x="3961246" y="4087789"/>
             <a:ext cx="2171700" cy="369332"/>
           </a:xfrm>
           <a:prstGeom prst="rect">
@@ -14074,36 +14111,6 @@
           </a:p>
         </p:txBody>
       </p:sp>
-      <p:pic>
-        <p:nvPicPr>
-          <p:cNvPr id="11" name="Picture 10">
-            <a:extLst>
-              <a:ext uri="{FF2B5EF4-FFF2-40B4-BE49-F238E27FC236}">
-                <a16:creationId xmlns:a16="http://schemas.microsoft.com/office/drawing/2014/main" id="{61C6F876-7742-BF4A-88C6-02B0957AE376}"/>
-              </a:ext>
-            </a:extLst>
-          </p:cNvPr>
-          <p:cNvPicPr>
-            <a:picLocks noChangeAspect="1"/>
-          </p:cNvPicPr>
-          <p:nvPr/>
-        </p:nvPicPr>
-        <p:blipFill>
-          <a:blip r:embed="rId4"/>
-          <a:stretch>
-            <a:fillRect/>
-          </a:stretch>
-        </p:blipFill>
-        <p:spPr>
-          <a:xfrm>
-            <a:off x="2903105" y="2895600"/>
-            <a:ext cx="3321050" cy="1210295"/>
-          </a:xfrm>
-          <a:prstGeom prst="rect">
-            <a:avLst/>
-          </a:prstGeom>
-        </p:spPr>
-      </p:pic>
       <p:sp>
         <p:nvSpPr>
           <p:cNvPr id="15" name="TextBox 14">
@@ -14185,12 +14192,42 @@
           </a:p>
         </p:txBody>
       </p:sp>
+      <p:pic>
+        <p:nvPicPr>
+          <p:cNvPr id="6" name="Picture 5">
+            <a:extLst>
+              <a:ext uri="{FF2B5EF4-FFF2-40B4-BE49-F238E27FC236}">
+                <a16:creationId xmlns:a16="http://schemas.microsoft.com/office/drawing/2014/main" id="{DB21FCB7-992A-A94C-9A6F-717F44B37673}"/>
+              </a:ext>
+            </a:extLst>
+          </p:cNvPr>
+          <p:cNvPicPr>
+            <a:picLocks noChangeAspect="1"/>
+          </p:cNvPicPr>
+          <p:nvPr/>
+        </p:nvPicPr>
+        <p:blipFill>
+          <a:blip r:embed="rId4"/>
+          <a:stretch>
+            <a:fillRect/>
+          </a:stretch>
+        </p:blipFill>
+        <p:spPr>
+          <a:xfrm>
+            <a:off x="2937741" y="2920712"/>
+            <a:ext cx="3266210" cy="1017662"/>
+          </a:xfrm>
+          <a:prstGeom prst="rect">
+            <a:avLst/>
+          </a:prstGeom>
+        </p:spPr>
+      </p:pic>
       <p:cxnSp>
         <p:nvCxnSpPr>
-          <p:cNvPr id="12" name="Straight Arrow Connector 11">
+          <p:cNvPr id="16" name="Straight Arrow Connector 15">
             <a:extLst>
               <a:ext uri="{FF2B5EF4-FFF2-40B4-BE49-F238E27FC236}">
-                <a16:creationId xmlns:a16="http://schemas.microsoft.com/office/drawing/2014/main" id="{63AD8535-5ED5-E84F-87FA-9FD89F9FA141}"/>
+                <a16:creationId xmlns:a16="http://schemas.microsoft.com/office/drawing/2014/main" id="{1F1659AD-D387-D849-8BD6-CA4E0EC81A81}"/>
               </a:ext>
             </a:extLst>
           </p:cNvPr>
@@ -14201,7 +14238,7 @@
         </p:nvCxnSpPr>
         <p:spPr>
           <a:xfrm>
-            <a:off x="6224155" y="3620414"/>
+            <a:off x="6203951" y="3652862"/>
             <a:ext cx="1341900" cy="0"/>
           </a:xfrm>
           <a:prstGeom prst="straightConnector1">
@@ -16723,7 +16760,7 @@
               <a:t> </a:t>
             </a:r>
             <a:r>
-              <a:rPr lang="en-US" dirty="0" err="1"/>
+              <a:rPr lang="en-US" i="1" dirty="0" err="1"/>
               <a:t>kubectl</a:t>
             </a:r>
             <a:r>
@@ -16787,13 +16824,13 @@
             <a:pPr lvl="1"/>
             <a:r>
               <a:rPr lang="en-US" sz="2800" dirty="0"/>
-              <a:t>Using the Kubernetes command line interface, </a:t>
-            </a:r>
-            <a:r>
-              <a:rPr lang="en-US" sz="2800" dirty="0" err="1"/>
-              <a:t>Kubectl</a:t>
-            </a:r>
-            <a:endParaRPr lang="en-US" sz="2800" dirty="0"/>
+              <a:t>Using the Kubernetes client, </a:t>
+            </a:r>
+            <a:r>
+              <a:rPr lang="en-US" sz="2800" i="1" dirty="0" err="1"/>
+              <a:t>kubectl</a:t>
+            </a:r>
+            <a:endParaRPr lang="en-US" sz="2800" i="1" dirty="0"/>
           </a:p>
           <a:p>
             <a:pPr lvl="2"/>
@@ -20726,7 +20763,7 @@
               <a:t> </a:t>
             </a:r>
             <a:r>
-              <a:rPr lang="en-US" dirty="0" err="1"/>
+              <a:rPr lang="en-US" i="1" dirty="0" err="1"/>
               <a:t>kubectl</a:t>
             </a:r>
             <a:r>
@@ -20768,8 +20805,8 @@
           <a:p>
             <a:pPr lvl="2"/>
             <a:r>
-              <a:rPr lang="en-US" sz="2200" dirty="0" err="1"/>
-              <a:t>Kubectl</a:t>
+              <a:rPr lang="en-US" sz="2200" i="1" dirty="0" err="1"/>
+              <a:t>kubectl</a:t>
             </a:r>
             <a:r>
               <a:rPr lang="en-US" sz="2200" dirty="0"/>

</xml_diff>